<commit_message>
Added initial files for new MP8 report, as well as Tanzir's MP6 files from this semester (they're the same assignment, with different numbers).
</commit_message>
<xml_diff>
--- a/R-PI_Episodes.pptx
+++ b/R-PI_Episodes.pptx
@@ -122,7 +122,7 @@
   </p:defaultTextStyle>
   <p:extLst>
     <p:ext uri="{EFAFB233-063F-42B5-8137-9DF3F51BA10A}">
-      <p15:sldGuideLst xmlns="" xmlns:a="http://schemas.openxmlformats.org/drawingml/2006/main" xmlns:r="http://schemas.openxmlformats.org/officeDocument/2006/relationships" xmlns:p="http://schemas.openxmlformats.org/presentationml/2006/main" xmlns:p15="http://schemas.microsoft.com/office/powerpoint/2012/main" xmlns:mv="urn:schemas-microsoft-com:mac:vml" xmlns:mc="http://schemas.openxmlformats.org/markup-compatibility/2006">
+      <p15:sldGuideLst xmlns:mc="http://schemas.openxmlformats.org/markup-compatibility/2006" xmlns:mv="urn:schemas-microsoft-com:mac:vml" xmlns:p15="http://schemas.microsoft.com/office/powerpoint/2012/main" xmlns:p="http://schemas.openxmlformats.org/presentationml/2006/main" xmlns:r="http://schemas.openxmlformats.org/officeDocument/2006/relationships" xmlns:a="http://schemas.openxmlformats.org/drawingml/2006/main" xmlns="">
         <p15:guide id="1" orient="horz" pos="2160">
           <p15:clr>
             <a:srgbClr val="A4A3A4"/>
@@ -222,7 +222,7 @@
             <a:fld id="{C9D036E1-0E73-436A-8B38-7D4D4D9821EC}" type="datetimeFigureOut">
               <a:rPr lang="en-US" smtClean="0"/>
               <a:pPr/>
-              <a:t>6/21/16</a:t>
+              <a:t>11/29/16</a:t>
             </a:fld>
             <a:endParaRPr lang="en-US"/>
           </a:p>
@@ -391,7 +391,7 @@
     </p:spTree>
     <p:extLst>
       <p:ext uri="{BB962C8B-B14F-4D97-AF65-F5344CB8AC3E}">
-        <p14:creationId xmlns="" xmlns:a="http://schemas.openxmlformats.org/drawingml/2006/main" xmlns:r="http://schemas.openxmlformats.org/officeDocument/2006/relationships" xmlns:p="http://schemas.openxmlformats.org/presentationml/2006/main" xmlns:p14="http://schemas.microsoft.com/office/powerpoint/2010/main" xmlns:mv="urn:schemas-microsoft-com:mac:vml" xmlns:mc="http://schemas.openxmlformats.org/markup-compatibility/2006" val="1001701201"/>
+        <p14:creationId xmlns:mc="http://schemas.openxmlformats.org/markup-compatibility/2006" xmlns:mv="urn:schemas-microsoft-com:mac:vml" xmlns:p14="http://schemas.microsoft.com/office/powerpoint/2010/main" xmlns:p="http://schemas.openxmlformats.org/presentationml/2006/main" xmlns:r="http://schemas.openxmlformats.org/officeDocument/2006/relationships" xmlns:a="http://schemas.openxmlformats.org/drawingml/2006/main" xmlns="" val="1001701201"/>
       </p:ext>
     </p:extLst>
   </p:cSld>
@@ -566,7 +566,7 @@
     </p:spTree>
     <p:extLst>
       <p:ext uri="{BB962C8B-B14F-4D97-AF65-F5344CB8AC3E}">
-        <p14:creationId xmlns="" xmlns:a="http://schemas.openxmlformats.org/drawingml/2006/main" xmlns:r="http://schemas.openxmlformats.org/officeDocument/2006/relationships" xmlns:p="http://schemas.openxmlformats.org/presentationml/2006/main" xmlns:p14="http://schemas.microsoft.com/office/powerpoint/2010/main" xmlns:mv="urn:schemas-microsoft-com:mac:vml" xmlns:mc="http://schemas.openxmlformats.org/markup-compatibility/2006" val="3137998360"/>
+        <p14:creationId xmlns:mc="http://schemas.openxmlformats.org/markup-compatibility/2006" xmlns:mv="urn:schemas-microsoft-com:mac:vml" xmlns:p14="http://schemas.microsoft.com/office/powerpoint/2010/main" xmlns:p="http://schemas.openxmlformats.org/presentationml/2006/main" xmlns:r="http://schemas.openxmlformats.org/officeDocument/2006/relationships" xmlns:a="http://schemas.openxmlformats.org/drawingml/2006/main" xmlns="" val="3137998360"/>
       </p:ext>
     </p:extLst>
   </p:cSld>
@@ -651,7 +651,7 @@
     </p:spTree>
     <p:extLst>
       <p:ext uri="{BB962C8B-B14F-4D97-AF65-F5344CB8AC3E}">
-        <p14:creationId xmlns="" xmlns:a="http://schemas.openxmlformats.org/drawingml/2006/main" xmlns:r="http://schemas.openxmlformats.org/officeDocument/2006/relationships" xmlns:p="http://schemas.openxmlformats.org/presentationml/2006/main" xmlns:p14="http://schemas.microsoft.com/office/powerpoint/2010/main" xmlns:mv="urn:schemas-microsoft-com:mac:vml" xmlns:mc="http://schemas.openxmlformats.org/markup-compatibility/2006" val="542780598"/>
+        <p14:creationId xmlns:mc="http://schemas.openxmlformats.org/markup-compatibility/2006" xmlns:mv="urn:schemas-microsoft-com:mac:vml" xmlns:p14="http://schemas.microsoft.com/office/powerpoint/2010/main" xmlns:p="http://schemas.openxmlformats.org/presentationml/2006/main" xmlns:r="http://schemas.openxmlformats.org/officeDocument/2006/relationships" xmlns:a="http://schemas.openxmlformats.org/drawingml/2006/main" xmlns="" val="542780598"/>
       </p:ext>
     </p:extLst>
   </p:cSld>
@@ -740,7 +740,7 @@
     </p:spTree>
     <p:extLst>
       <p:ext uri="{BB962C8B-B14F-4D97-AF65-F5344CB8AC3E}">
-        <p14:creationId xmlns="" xmlns:a="http://schemas.openxmlformats.org/drawingml/2006/main" xmlns:r="http://schemas.openxmlformats.org/officeDocument/2006/relationships" xmlns:p="http://schemas.openxmlformats.org/presentationml/2006/main" xmlns:p14="http://schemas.microsoft.com/office/powerpoint/2010/main" xmlns:mv="urn:schemas-microsoft-com:mac:vml" xmlns:mc="http://schemas.openxmlformats.org/markup-compatibility/2006" val="1536340321"/>
+        <p14:creationId xmlns:mc="http://schemas.openxmlformats.org/markup-compatibility/2006" xmlns:mv="urn:schemas-microsoft-com:mac:vml" xmlns:p14="http://schemas.microsoft.com/office/powerpoint/2010/main" xmlns:p="http://schemas.openxmlformats.org/presentationml/2006/main" xmlns:r="http://schemas.openxmlformats.org/officeDocument/2006/relationships" xmlns:a="http://schemas.openxmlformats.org/drawingml/2006/main" xmlns="" val="1536340321"/>
       </p:ext>
     </p:extLst>
   </p:cSld>
@@ -796,14 +796,6 @@
           </a:bodyPr>
           <a:lstStyle/>
           <a:p>
-            <a:r>
-              <a:rPr lang="en-US" dirty="0" smtClean="0"/>
-              <a:t>Add shared</a:t>
-            </a:r>
-            <a:r>
-              <a:rPr lang="en-US" baseline="0" dirty="0" smtClean="0"/>
-              <a:t> memory?</a:t>
-            </a:r>
             <a:endParaRPr lang="en-US" dirty="0"/>
           </a:p>
         </p:txBody>
@@ -1082,7 +1074,7 @@
     </p:spTree>
     <p:extLst>
       <p:ext uri="{BB962C8B-B14F-4D97-AF65-F5344CB8AC3E}">
-        <p14:creationId xmlns="" xmlns:a="http://schemas.openxmlformats.org/drawingml/2006/main" xmlns:r="http://schemas.openxmlformats.org/officeDocument/2006/relationships" xmlns:p="http://schemas.openxmlformats.org/presentationml/2006/main" xmlns:p14="http://schemas.microsoft.com/office/powerpoint/2010/main" xmlns:mv="urn:schemas-microsoft-com:mac:vml" xmlns:mc="http://schemas.openxmlformats.org/markup-compatibility/2006" val="3087158655"/>
+        <p14:creationId xmlns:mc="http://schemas.openxmlformats.org/markup-compatibility/2006" xmlns:mv="urn:schemas-microsoft-com:mac:vml" xmlns:p14="http://schemas.microsoft.com/office/powerpoint/2010/main" xmlns:p="http://schemas.openxmlformats.org/presentationml/2006/main" xmlns:r="http://schemas.openxmlformats.org/officeDocument/2006/relationships" xmlns:a="http://schemas.openxmlformats.org/drawingml/2006/main" xmlns="" val="3087158655"/>
       </p:ext>
     </p:extLst>
   </p:cSld>
@@ -1369,7 +1361,7 @@
     </p:spTree>
     <p:extLst>
       <p:ext uri="{BB962C8B-B14F-4D97-AF65-F5344CB8AC3E}">
-        <p14:creationId xmlns="" xmlns:a="http://schemas.openxmlformats.org/drawingml/2006/main" xmlns:r="http://schemas.openxmlformats.org/officeDocument/2006/relationships" xmlns:p="http://schemas.openxmlformats.org/presentationml/2006/main" xmlns:p14="http://schemas.microsoft.com/office/powerpoint/2010/main" xmlns:mv="urn:schemas-microsoft-com:mac:vml" xmlns:mc="http://schemas.openxmlformats.org/markup-compatibility/2006" val="3133740688"/>
+        <p14:creationId xmlns:mc="http://schemas.openxmlformats.org/markup-compatibility/2006" xmlns:mv="urn:schemas-microsoft-com:mac:vml" xmlns:p14="http://schemas.microsoft.com/office/powerpoint/2010/main" xmlns:p="http://schemas.openxmlformats.org/presentationml/2006/main" xmlns:r="http://schemas.openxmlformats.org/officeDocument/2006/relationships" xmlns:a="http://schemas.openxmlformats.org/drawingml/2006/main" xmlns="" val="3133740688"/>
       </p:ext>
     </p:extLst>
   </p:cSld>
@@ -1568,7 +1560,7 @@
     </p:spTree>
     <p:extLst>
       <p:ext uri="{BB962C8B-B14F-4D97-AF65-F5344CB8AC3E}">
-        <p14:creationId xmlns="" xmlns:a="http://schemas.openxmlformats.org/drawingml/2006/main" xmlns:r="http://schemas.openxmlformats.org/officeDocument/2006/relationships" xmlns:p="http://schemas.openxmlformats.org/presentationml/2006/main" xmlns:p14="http://schemas.microsoft.com/office/powerpoint/2010/main" xmlns:mv="urn:schemas-microsoft-com:mac:vml" xmlns:mc="http://schemas.openxmlformats.org/markup-compatibility/2006" val="2361044166"/>
+        <p14:creationId xmlns:mc="http://schemas.openxmlformats.org/markup-compatibility/2006" xmlns:mv="urn:schemas-microsoft-com:mac:vml" xmlns:p14="http://schemas.microsoft.com/office/powerpoint/2010/main" xmlns:p="http://schemas.openxmlformats.org/presentationml/2006/main" xmlns:r="http://schemas.openxmlformats.org/officeDocument/2006/relationships" xmlns:a="http://schemas.openxmlformats.org/drawingml/2006/main" xmlns="" val="2361044166"/>
       </p:ext>
     </p:extLst>
   </p:cSld>
@@ -1940,7 +1932,7 @@
     </p:spTree>
     <p:extLst>
       <p:ext uri="{BB962C8B-B14F-4D97-AF65-F5344CB8AC3E}">
-        <p14:creationId xmlns="" xmlns:a="http://schemas.openxmlformats.org/drawingml/2006/main" xmlns:r="http://schemas.openxmlformats.org/officeDocument/2006/relationships" xmlns:p="http://schemas.openxmlformats.org/presentationml/2006/main" xmlns:p14="http://schemas.microsoft.com/office/powerpoint/2010/main" xmlns:mv="urn:schemas-microsoft-com:mac:vml" xmlns:mc="http://schemas.openxmlformats.org/markup-compatibility/2006" val="4046478381"/>
+        <p14:creationId xmlns:mc="http://schemas.openxmlformats.org/markup-compatibility/2006" xmlns:mv="urn:schemas-microsoft-com:mac:vml" xmlns:p14="http://schemas.microsoft.com/office/powerpoint/2010/main" xmlns:p="http://schemas.openxmlformats.org/presentationml/2006/main" xmlns:r="http://schemas.openxmlformats.org/officeDocument/2006/relationships" xmlns:a="http://schemas.openxmlformats.org/drawingml/2006/main" xmlns="" val="4046478381"/>
       </p:ext>
     </p:extLst>
   </p:cSld>
@@ -2192,7 +2184,7 @@
     </p:spTree>
     <p:extLst>
       <p:ext uri="{BB962C8B-B14F-4D97-AF65-F5344CB8AC3E}">
-        <p14:creationId xmlns="" xmlns:a="http://schemas.openxmlformats.org/drawingml/2006/main" xmlns:r="http://schemas.openxmlformats.org/officeDocument/2006/relationships" xmlns:p="http://schemas.openxmlformats.org/presentationml/2006/main" xmlns:p14="http://schemas.microsoft.com/office/powerpoint/2010/main" xmlns:mv="urn:schemas-microsoft-com:mac:vml" xmlns:mc="http://schemas.openxmlformats.org/markup-compatibility/2006" val="337256706"/>
+        <p14:creationId xmlns:mc="http://schemas.openxmlformats.org/markup-compatibility/2006" xmlns:mv="urn:schemas-microsoft-com:mac:vml" xmlns:p14="http://schemas.microsoft.com/office/powerpoint/2010/main" xmlns:p="http://schemas.openxmlformats.org/presentationml/2006/main" xmlns:r="http://schemas.openxmlformats.org/officeDocument/2006/relationships" xmlns:a="http://schemas.openxmlformats.org/drawingml/2006/main" xmlns="" val="337256706"/>
       </p:ext>
     </p:extLst>
   </p:cSld>
@@ -2820,7 +2812,7 @@
     </p:spTree>
     <p:extLst>
       <p:ext uri="{BB962C8B-B14F-4D97-AF65-F5344CB8AC3E}">
-        <p14:creationId xmlns="" xmlns:a="http://schemas.openxmlformats.org/drawingml/2006/main" xmlns:r="http://schemas.openxmlformats.org/officeDocument/2006/relationships" xmlns:p="http://schemas.openxmlformats.org/presentationml/2006/main" xmlns:p14="http://schemas.microsoft.com/office/powerpoint/2010/main" xmlns:mv="urn:schemas-microsoft-com:mac:vml" xmlns:mc="http://schemas.openxmlformats.org/markup-compatibility/2006" val="2543491289"/>
+        <p14:creationId xmlns:mc="http://schemas.openxmlformats.org/markup-compatibility/2006" xmlns:mv="urn:schemas-microsoft-com:mac:vml" xmlns:p14="http://schemas.microsoft.com/office/powerpoint/2010/main" xmlns:p="http://schemas.openxmlformats.org/presentationml/2006/main" xmlns:r="http://schemas.openxmlformats.org/officeDocument/2006/relationships" xmlns:a="http://schemas.openxmlformats.org/drawingml/2006/main" xmlns="" val="2543491289"/>
       </p:ext>
     </p:extLst>
   </p:cSld>
@@ -3685,7 +3677,7 @@
     </p:spTree>
     <p:extLst>
       <p:ext uri="{BB962C8B-B14F-4D97-AF65-F5344CB8AC3E}">
-        <p14:creationId xmlns="" xmlns:a="http://schemas.openxmlformats.org/drawingml/2006/main" xmlns:r="http://schemas.openxmlformats.org/officeDocument/2006/relationships" xmlns:p="http://schemas.openxmlformats.org/presentationml/2006/main" xmlns:p14="http://schemas.microsoft.com/office/powerpoint/2010/main" xmlns:mv="urn:schemas-microsoft-com:mac:vml" xmlns:mc="http://schemas.openxmlformats.org/markup-compatibility/2006" val="336254129"/>
+        <p14:creationId xmlns:mc="http://schemas.openxmlformats.org/markup-compatibility/2006" xmlns:mv="urn:schemas-microsoft-com:mac:vml" xmlns:p14="http://schemas.microsoft.com/office/powerpoint/2010/main" xmlns:p="http://schemas.openxmlformats.org/presentationml/2006/main" xmlns:r="http://schemas.openxmlformats.org/officeDocument/2006/relationships" xmlns:a="http://schemas.openxmlformats.org/drawingml/2006/main" xmlns="" val="336254129"/>
       </p:ext>
     </p:extLst>
   </p:cSld>
@@ -3860,7 +3852,7 @@
     </p:spTree>
     <p:extLst>
       <p:ext uri="{BB962C8B-B14F-4D97-AF65-F5344CB8AC3E}">
-        <p14:creationId xmlns="" xmlns:a="http://schemas.openxmlformats.org/drawingml/2006/main" xmlns:r="http://schemas.openxmlformats.org/officeDocument/2006/relationships" xmlns:p="http://schemas.openxmlformats.org/presentationml/2006/main" xmlns:p14="http://schemas.microsoft.com/office/powerpoint/2010/main" xmlns:mv="urn:schemas-microsoft-com:mac:vml" xmlns:mc="http://schemas.openxmlformats.org/markup-compatibility/2006" val="1658958873"/>
+        <p14:creationId xmlns:mc="http://schemas.openxmlformats.org/markup-compatibility/2006" xmlns:mv="urn:schemas-microsoft-com:mac:vml" xmlns:p14="http://schemas.microsoft.com/office/powerpoint/2010/main" xmlns:p="http://schemas.openxmlformats.org/presentationml/2006/main" xmlns:r="http://schemas.openxmlformats.org/officeDocument/2006/relationships" xmlns:a="http://schemas.openxmlformats.org/drawingml/2006/main" xmlns="" val="1658958873"/>
       </p:ext>
     </p:extLst>
   </p:cSld>
@@ -4045,7 +4037,7 @@
     </p:spTree>
     <p:extLst>
       <p:ext uri="{BB962C8B-B14F-4D97-AF65-F5344CB8AC3E}">
-        <p14:creationId xmlns="" xmlns:a="http://schemas.openxmlformats.org/drawingml/2006/main" xmlns:r="http://schemas.openxmlformats.org/officeDocument/2006/relationships" xmlns:p="http://schemas.openxmlformats.org/presentationml/2006/main" xmlns:p14="http://schemas.microsoft.com/office/powerpoint/2010/main" xmlns:mv="urn:schemas-microsoft-com:mac:vml" xmlns:mc="http://schemas.openxmlformats.org/markup-compatibility/2006" val="1527915489"/>
+        <p14:creationId xmlns:mc="http://schemas.openxmlformats.org/markup-compatibility/2006" xmlns:mv="urn:schemas-microsoft-com:mac:vml" xmlns:p14="http://schemas.microsoft.com/office/powerpoint/2010/main" xmlns:p="http://schemas.openxmlformats.org/presentationml/2006/main" xmlns:r="http://schemas.openxmlformats.org/officeDocument/2006/relationships" xmlns:a="http://schemas.openxmlformats.org/drawingml/2006/main" xmlns="" val="1527915489"/>
       </p:ext>
     </p:extLst>
   </p:cSld>
@@ -4235,7 +4227,7 @@
     </p:spTree>
     <p:extLst>
       <p:ext uri="{BB962C8B-B14F-4D97-AF65-F5344CB8AC3E}">
-        <p14:creationId xmlns="" xmlns:a="http://schemas.openxmlformats.org/drawingml/2006/main" xmlns:r="http://schemas.openxmlformats.org/officeDocument/2006/relationships" xmlns:p="http://schemas.openxmlformats.org/presentationml/2006/main" xmlns:p14="http://schemas.microsoft.com/office/powerpoint/2010/main" xmlns:mv="urn:schemas-microsoft-com:mac:vml" xmlns:mc="http://schemas.openxmlformats.org/markup-compatibility/2006" val="2392396094"/>
+        <p14:creationId xmlns:mc="http://schemas.openxmlformats.org/markup-compatibility/2006" xmlns:mv="urn:schemas-microsoft-com:mac:vml" xmlns:p14="http://schemas.microsoft.com/office/powerpoint/2010/main" xmlns:p="http://schemas.openxmlformats.org/presentationml/2006/main" xmlns:r="http://schemas.openxmlformats.org/officeDocument/2006/relationships" xmlns:a="http://schemas.openxmlformats.org/drawingml/2006/main" xmlns="" val="2392396094"/>
       </p:ext>
     </p:extLst>
   </p:cSld>
@@ -4494,7 +4486,7 @@
     </p:spTree>
     <p:extLst>
       <p:ext uri="{BB962C8B-B14F-4D97-AF65-F5344CB8AC3E}">
-        <p14:creationId xmlns="" xmlns:a="http://schemas.openxmlformats.org/drawingml/2006/main" xmlns:r="http://schemas.openxmlformats.org/officeDocument/2006/relationships" xmlns:p="http://schemas.openxmlformats.org/presentationml/2006/main" xmlns:p14="http://schemas.microsoft.com/office/powerpoint/2010/main" xmlns:mv="urn:schemas-microsoft-com:mac:vml" xmlns:mc="http://schemas.openxmlformats.org/markup-compatibility/2006" val="2358323590"/>
+        <p14:creationId xmlns:mc="http://schemas.openxmlformats.org/markup-compatibility/2006" xmlns:mv="urn:schemas-microsoft-com:mac:vml" xmlns:p14="http://schemas.microsoft.com/office/powerpoint/2010/main" xmlns:p="http://schemas.openxmlformats.org/presentationml/2006/main" xmlns:r="http://schemas.openxmlformats.org/officeDocument/2006/relationships" xmlns:a="http://schemas.openxmlformats.org/drawingml/2006/main" xmlns="" val="2358323590"/>
       </p:ext>
     </p:extLst>
   </p:cSld>
@@ -4791,7 +4783,7 @@
     </p:spTree>
     <p:extLst>
       <p:ext uri="{BB962C8B-B14F-4D97-AF65-F5344CB8AC3E}">
-        <p14:creationId xmlns="" xmlns:a="http://schemas.openxmlformats.org/drawingml/2006/main" xmlns:r="http://schemas.openxmlformats.org/officeDocument/2006/relationships" xmlns:p="http://schemas.openxmlformats.org/presentationml/2006/main" xmlns:p14="http://schemas.microsoft.com/office/powerpoint/2010/main" xmlns:mv="urn:schemas-microsoft-com:mac:vml" xmlns:mc="http://schemas.openxmlformats.org/markup-compatibility/2006" val="1270547220"/>
+        <p14:creationId xmlns:mc="http://schemas.openxmlformats.org/markup-compatibility/2006" xmlns:mv="urn:schemas-microsoft-com:mac:vml" xmlns:p14="http://schemas.microsoft.com/office/powerpoint/2010/main" xmlns:p="http://schemas.openxmlformats.org/presentationml/2006/main" xmlns:r="http://schemas.openxmlformats.org/officeDocument/2006/relationships" xmlns:a="http://schemas.openxmlformats.org/drawingml/2006/main" xmlns="" val="1270547220"/>
       </p:ext>
     </p:extLst>
   </p:cSld>
@@ -5240,7 +5232,7 @@
     </p:spTree>
     <p:extLst>
       <p:ext uri="{BB962C8B-B14F-4D97-AF65-F5344CB8AC3E}">
-        <p14:creationId xmlns="" xmlns:a="http://schemas.openxmlformats.org/drawingml/2006/main" xmlns:r="http://schemas.openxmlformats.org/officeDocument/2006/relationships" xmlns:p="http://schemas.openxmlformats.org/presentationml/2006/main" xmlns:p14="http://schemas.microsoft.com/office/powerpoint/2010/main" xmlns:mv="urn:schemas-microsoft-com:mac:vml" xmlns:mc="http://schemas.openxmlformats.org/markup-compatibility/2006" val="3959495982"/>
+        <p14:creationId xmlns:mc="http://schemas.openxmlformats.org/markup-compatibility/2006" xmlns:mv="urn:schemas-microsoft-com:mac:vml" xmlns:p14="http://schemas.microsoft.com/office/powerpoint/2010/main" xmlns:p="http://schemas.openxmlformats.org/presentationml/2006/main" xmlns:r="http://schemas.openxmlformats.org/officeDocument/2006/relationships" xmlns:a="http://schemas.openxmlformats.org/drawingml/2006/main" xmlns="" val="3959495982"/>
       </p:ext>
     </p:extLst>
   </p:cSld>
@@ -5363,7 +5355,7 @@
     </p:spTree>
     <p:extLst>
       <p:ext uri="{BB962C8B-B14F-4D97-AF65-F5344CB8AC3E}">
-        <p14:creationId xmlns="" xmlns:a="http://schemas.openxmlformats.org/drawingml/2006/main" xmlns:r="http://schemas.openxmlformats.org/officeDocument/2006/relationships" xmlns:p="http://schemas.openxmlformats.org/presentationml/2006/main" xmlns:p14="http://schemas.microsoft.com/office/powerpoint/2010/main" xmlns:mv="urn:schemas-microsoft-com:mac:vml" xmlns:mc="http://schemas.openxmlformats.org/markup-compatibility/2006" val="2083255098"/>
+        <p14:creationId xmlns:mc="http://schemas.openxmlformats.org/markup-compatibility/2006" xmlns:mv="urn:schemas-microsoft-com:mac:vml" xmlns:p14="http://schemas.microsoft.com/office/powerpoint/2010/main" xmlns:p="http://schemas.openxmlformats.org/presentationml/2006/main" xmlns:r="http://schemas.openxmlformats.org/officeDocument/2006/relationships" xmlns:a="http://schemas.openxmlformats.org/drawingml/2006/main" xmlns="" val="2083255098"/>
       </p:ext>
     </p:extLst>
   </p:cSld>
@@ -5463,7 +5455,7 @@
     </p:spTree>
     <p:extLst>
       <p:ext uri="{BB962C8B-B14F-4D97-AF65-F5344CB8AC3E}">
-        <p14:creationId xmlns="" xmlns:a="http://schemas.openxmlformats.org/drawingml/2006/main" xmlns:r="http://schemas.openxmlformats.org/officeDocument/2006/relationships" xmlns:p="http://schemas.openxmlformats.org/presentationml/2006/main" xmlns:p14="http://schemas.microsoft.com/office/powerpoint/2010/main" xmlns:mv="urn:schemas-microsoft-com:mac:vml" xmlns:mc="http://schemas.openxmlformats.org/markup-compatibility/2006" val="3441215109"/>
+        <p14:creationId xmlns:mc="http://schemas.openxmlformats.org/markup-compatibility/2006" xmlns:mv="urn:schemas-microsoft-com:mac:vml" xmlns:p14="http://schemas.microsoft.com/office/powerpoint/2010/main" xmlns:p="http://schemas.openxmlformats.org/presentationml/2006/main" xmlns:r="http://schemas.openxmlformats.org/officeDocument/2006/relationships" xmlns:a="http://schemas.openxmlformats.org/drawingml/2006/main" xmlns="" val="3441215109"/>
       </p:ext>
     </p:extLst>
   </p:cSld>
@@ -5747,7 +5739,7 @@
     </p:spTree>
     <p:extLst>
       <p:ext uri="{BB962C8B-B14F-4D97-AF65-F5344CB8AC3E}">
-        <p14:creationId xmlns="" xmlns:a="http://schemas.openxmlformats.org/drawingml/2006/main" xmlns:r="http://schemas.openxmlformats.org/officeDocument/2006/relationships" xmlns:p="http://schemas.openxmlformats.org/presentationml/2006/main" xmlns:p14="http://schemas.microsoft.com/office/powerpoint/2010/main" xmlns:mv="urn:schemas-microsoft-com:mac:vml" xmlns:mc="http://schemas.openxmlformats.org/markup-compatibility/2006" val="1353266932"/>
+        <p14:creationId xmlns:mc="http://schemas.openxmlformats.org/markup-compatibility/2006" xmlns:mv="urn:schemas-microsoft-com:mac:vml" xmlns:p14="http://schemas.microsoft.com/office/powerpoint/2010/main" xmlns:p="http://schemas.openxmlformats.org/presentationml/2006/main" xmlns:r="http://schemas.openxmlformats.org/officeDocument/2006/relationships" xmlns:a="http://schemas.openxmlformats.org/drawingml/2006/main" xmlns="" val="1353266932"/>
       </p:ext>
     </p:extLst>
   </p:cSld>
@@ -6027,7 +6019,7 @@
     </p:spTree>
     <p:extLst>
       <p:ext uri="{BB962C8B-B14F-4D97-AF65-F5344CB8AC3E}">
-        <p14:creationId xmlns="" xmlns:a="http://schemas.openxmlformats.org/drawingml/2006/main" xmlns:r="http://schemas.openxmlformats.org/officeDocument/2006/relationships" xmlns:p="http://schemas.openxmlformats.org/presentationml/2006/main" xmlns:p14="http://schemas.microsoft.com/office/powerpoint/2010/main" xmlns:mv="urn:schemas-microsoft-com:mac:vml" xmlns:mc="http://schemas.openxmlformats.org/markup-compatibility/2006" val="3117450407"/>
+        <p14:creationId xmlns:mc="http://schemas.openxmlformats.org/markup-compatibility/2006" xmlns:mv="urn:schemas-microsoft-com:mac:vml" xmlns:p14="http://schemas.microsoft.com/office/powerpoint/2010/main" xmlns:p="http://schemas.openxmlformats.org/presentationml/2006/main" xmlns:r="http://schemas.openxmlformats.org/officeDocument/2006/relationships" xmlns:a="http://schemas.openxmlformats.org/drawingml/2006/main" xmlns="" val="3117450407"/>
       </p:ext>
     </p:extLst>
   </p:cSld>
@@ -6071,7 +6063,7 @@
           <a:blip r:embed="rId19" cstate="print">
             <a:extLst>
               <a:ext uri="{28A0092B-C50C-407E-A947-70E740481C1C}">
-                <a14:useLocalDpi xmlns="" xmlns:a="http://schemas.openxmlformats.org/drawingml/2006/main" xmlns:r="http://schemas.openxmlformats.org/officeDocument/2006/relationships" xmlns:p="http://schemas.openxmlformats.org/presentationml/2006/main" xmlns:a14="http://schemas.microsoft.com/office/drawing/2010/main" xmlns:mv="urn:schemas-microsoft-com:mac:vml" xmlns:mc="http://schemas.openxmlformats.org/markup-compatibility/2006" val="0"/>
+                <a14:useLocalDpi xmlns:mc="http://schemas.openxmlformats.org/markup-compatibility/2006" xmlns:mv="urn:schemas-microsoft-com:mac:vml" xmlns:a14="http://schemas.microsoft.com/office/drawing/2010/main" xmlns:p="http://schemas.openxmlformats.org/presentationml/2006/main" xmlns:r="http://schemas.openxmlformats.org/officeDocument/2006/relationships" xmlns:a="http://schemas.openxmlformats.org/drawingml/2006/main" xmlns="" val="0"/>
               </a:ext>
             </a:extLst>
           </a:blip>
@@ -6100,7 +6092,7 @@
           <a:blip r:embed="rId20" cstate="print">
             <a:extLst>
               <a:ext uri="{28A0092B-C50C-407E-A947-70E740481C1C}">
-                <a14:useLocalDpi xmlns="" xmlns:a="http://schemas.openxmlformats.org/drawingml/2006/main" xmlns:r="http://schemas.openxmlformats.org/officeDocument/2006/relationships" xmlns:p="http://schemas.openxmlformats.org/presentationml/2006/main" xmlns:a14="http://schemas.microsoft.com/office/drawing/2010/main" xmlns:mv="urn:schemas-microsoft-com:mac:vml" xmlns:mc="http://schemas.openxmlformats.org/markup-compatibility/2006" val="0"/>
+                <a14:useLocalDpi xmlns:mc="http://schemas.openxmlformats.org/markup-compatibility/2006" xmlns:mv="urn:schemas-microsoft-com:mac:vml" xmlns:a14="http://schemas.microsoft.com/office/drawing/2010/main" xmlns:p="http://schemas.openxmlformats.org/presentationml/2006/main" xmlns:r="http://schemas.openxmlformats.org/officeDocument/2006/relationships" xmlns:a="http://schemas.openxmlformats.org/drawingml/2006/main" xmlns="" val="0"/>
               </a:ext>
             </a:extLst>
           </a:blip>
@@ -6192,7 +6184,7 @@
           <a:blip r:embed="rId21" cstate="print">
             <a:extLst>
               <a:ext uri="{28A0092B-C50C-407E-A947-70E740481C1C}">
-                <a14:useLocalDpi xmlns="" xmlns:a="http://schemas.openxmlformats.org/drawingml/2006/main" xmlns:r="http://schemas.openxmlformats.org/officeDocument/2006/relationships" xmlns:p="http://schemas.openxmlformats.org/presentationml/2006/main" xmlns:a14="http://schemas.microsoft.com/office/drawing/2010/main" xmlns:mv="urn:schemas-microsoft-com:mac:vml" xmlns:mc="http://schemas.openxmlformats.org/markup-compatibility/2006" val="0"/>
+                <a14:useLocalDpi xmlns:mc="http://schemas.openxmlformats.org/markup-compatibility/2006" xmlns:mv="urn:schemas-microsoft-com:mac:vml" xmlns:a14="http://schemas.microsoft.com/office/drawing/2010/main" xmlns:p="http://schemas.openxmlformats.org/presentationml/2006/main" xmlns:r="http://schemas.openxmlformats.org/officeDocument/2006/relationships" xmlns:a="http://schemas.openxmlformats.org/drawingml/2006/main" xmlns="" val="0"/>
               </a:ext>
             </a:extLst>
           </a:blip>
@@ -6221,7 +6213,7 @@
           <a:blip r:embed="rId22" cstate="print">
             <a:extLst>
               <a:ext uri="{28A0092B-C50C-407E-A947-70E740481C1C}">
-                <a14:useLocalDpi xmlns="" xmlns:a="http://schemas.openxmlformats.org/drawingml/2006/main" xmlns:r="http://schemas.openxmlformats.org/officeDocument/2006/relationships" xmlns:p="http://schemas.openxmlformats.org/presentationml/2006/main" xmlns:a14="http://schemas.microsoft.com/office/drawing/2010/main" xmlns:mv="urn:schemas-microsoft-com:mac:vml" xmlns:mc="http://schemas.openxmlformats.org/markup-compatibility/2006" val="0"/>
+                <a14:useLocalDpi xmlns:mc="http://schemas.openxmlformats.org/markup-compatibility/2006" xmlns:mv="urn:schemas-microsoft-com:mac:vml" xmlns:a14="http://schemas.microsoft.com/office/drawing/2010/main" xmlns:p="http://schemas.openxmlformats.org/presentationml/2006/main" xmlns:r="http://schemas.openxmlformats.org/officeDocument/2006/relationships" xmlns:a="http://schemas.openxmlformats.org/drawingml/2006/main" xmlns="" val="0"/>
               </a:ext>
             </a:extLst>
           </a:blip>
@@ -6498,7 +6490,7 @@
     </p:spTree>
     <p:extLst>
       <p:ext uri="{BB962C8B-B14F-4D97-AF65-F5344CB8AC3E}">
-        <p14:creationId xmlns="" xmlns:a="http://schemas.openxmlformats.org/drawingml/2006/main" xmlns:r="http://schemas.openxmlformats.org/officeDocument/2006/relationships" xmlns:p="http://schemas.openxmlformats.org/presentationml/2006/main" xmlns:p14="http://schemas.microsoft.com/office/powerpoint/2010/main" xmlns:mv="urn:schemas-microsoft-com:mac:vml" xmlns:mc="http://schemas.openxmlformats.org/markup-compatibility/2006" val="754166090"/>
+        <p14:creationId xmlns:mc="http://schemas.openxmlformats.org/markup-compatibility/2006" xmlns:mv="urn:schemas-microsoft-com:mac:vml" xmlns:p14="http://schemas.microsoft.com/office/powerpoint/2010/main" xmlns:p="http://schemas.openxmlformats.org/presentationml/2006/main" xmlns:r="http://schemas.openxmlformats.org/officeDocument/2006/relationships" xmlns:a="http://schemas.openxmlformats.org/drawingml/2006/main" xmlns="" val="754166090"/>
       </p:ext>
     </p:extLst>
   </p:cSld>
@@ -6965,7 +6957,7 @@
     </p:spTree>
     <p:extLst>
       <p:ext uri="{BB962C8B-B14F-4D97-AF65-F5344CB8AC3E}">
-        <p14:creationId xmlns="" xmlns:a="http://schemas.openxmlformats.org/drawingml/2006/main" xmlns:r="http://schemas.openxmlformats.org/officeDocument/2006/relationships" xmlns:p="http://schemas.openxmlformats.org/presentationml/2006/main" xmlns:p14="http://schemas.microsoft.com/office/powerpoint/2010/main" xmlns:mv="urn:schemas-microsoft-com:mac:vml" xmlns:mc="http://schemas.openxmlformats.org/markup-compatibility/2006" val="1339980332"/>
+        <p14:creationId xmlns:mc="http://schemas.openxmlformats.org/markup-compatibility/2006" xmlns:mv="urn:schemas-microsoft-com:mac:vml" xmlns:p14="http://schemas.microsoft.com/office/powerpoint/2010/main" xmlns:p="http://schemas.openxmlformats.org/presentationml/2006/main" xmlns:r="http://schemas.openxmlformats.org/officeDocument/2006/relationships" xmlns:a="http://schemas.openxmlformats.org/drawingml/2006/main" xmlns="" val="1339980332"/>
       </p:ext>
     </p:extLst>
   </p:cSld>
@@ -7155,7 +7147,7 @@
     </p:spTree>
     <p:extLst>
       <p:ext uri="{BB962C8B-B14F-4D97-AF65-F5344CB8AC3E}">
-        <p14:creationId xmlns="" xmlns:a="http://schemas.openxmlformats.org/drawingml/2006/main" xmlns:r="http://schemas.openxmlformats.org/officeDocument/2006/relationships" xmlns:p="http://schemas.openxmlformats.org/presentationml/2006/main" xmlns:p14="http://schemas.microsoft.com/office/powerpoint/2010/main" xmlns:mv="urn:schemas-microsoft-com:mac:vml" xmlns:mc="http://schemas.openxmlformats.org/markup-compatibility/2006" val="3338837192"/>
+        <p14:creationId xmlns:mc="http://schemas.openxmlformats.org/markup-compatibility/2006" xmlns:mv="urn:schemas-microsoft-com:mac:vml" xmlns:p14="http://schemas.microsoft.com/office/powerpoint/2010/main" xmlns:p="http://schemas.openxmlformats.org/presentationml/2006/main" xmlns:r="http://schemas.openxmlformats.org/officeDocument/2006/relationships" xmlns:a="http://schemas.openxmlformats.org/drawingml/2006/main" xmlns="" val="3338837192"/>
       </p:ext>
     </p:extLst>
   </p:cSld>
@@ -7388,7 +7380,7 @@
     </p:spTree>
     <p:extLst>
       <p:ext uri="{BB962C8B-B14F-4D97-AF65-F5344CB8AC3E}">
-        <p14:creationId xmlns="" xmlns:a="http://schemas.openxmlformats.org/drawingml/2006/main" xmlns:r="http://schemas.openxmlformats.org/officeDocument/2006/relationships" xmlns:p="http://schemas.openxmlformats.org/presentationml/2006/main" xmlns:p14="http://schemas.microsoft.com/office/powerpoint/2010/main" xmlns:mv="urn:schemas-microsoft-com:mac:vml" xmlns:mc="http://schemas.openxmlformats.org/markup-compatibility/2006" val="861637662"/>
+        <p14:creationId xmlns:mc="http://schemas.openxmlformats.org/markup-compatibility/2006" xmlns:mv="urn:schemas-microsoft-com:mac:vml" xmlns:p14="http://schemas.microsoft.com/office/powerpoint/2010/main" xmlns:p="http://schemas.openxmlformats.org/presentationml/2006/main" xmlns:r="http://schemas.openxmlformats.org/officeDocument/2006/relationships" xmlns:a="http://schemas.openxmlformats.org/drawingml/2006/main" xmlns="" val="861637662"/>
       </p:ext>
     </p:extLst>
   </p:cSld>
@@ -7614,7 +7606,7 @@
     </p:spTree>
     <p:extLst>
       <p:ext uri="{BB962C8B-B14F-4D97-AF65-F5344CB8AC3E}">
-        <p14:creationId xmlns="" xmlns:a="http://schemas.openxmlformats.org/drawingml/2006/main" xmlns:r="http://schemas.openxmlformats.org/officeDocument/2006/relationships" xmlns:p="http://schemas.openxmlformats.org/presentationml/2006/main" xmlns:p14="http://schemas.microsoft.com/office/powerpoint/2010/main" xmlns:mv="urn:schemas-microsoft-com:mac:vml" xmlns:mc="http://schemas.openxmlformats.org/markup-compatibility/2006" val="861637662"/>
+        <p14:creationId xmlns:mc="http://schemas.openxmlformats.org/markup-compatibility/2006" xmlns:mv="urn:schemas-microsoft-com:mac:vml" xmlns:p14="http://schemas.microsoft.com/office/powerpoint/2010/main" xmlns:p="http://schemas.openxmlformats.org/presentationml/2006/main" xmlns:r="http://schemas.openxmlformats.org/officeDocument/2006/relationships" xmlns:a="http://schemas.openxmlformats.org/drawingml/2006/main" xmlns="" val="861637662"/>
       </p:ext>
     </p:extLst>
   </p:cSld>
@@ -7751,15 +7743,7 @@
             <a:pPr lvl="1"/>
             <a:r>
               <a:rPr lang="en-US" dirty="0" smtClean="0"/>
-              <a:t>Investigate IPC mechanisms: </a:t>
-            </a:r>
-            <a:r>
-              <a:rPr lang="en-US" dirty="0" smtClean="0"/>
-              <a:t>named/</a:t>
-            </a:r>
-            <a:r>
-              <a:rPr lang="en-US" dirty="0" smtClean="0"/>
-              <a:t>unnamed pipes, message queues, shared memory, and signals</a:t>
+              <a:t>Investigate IPC mechanisms: named/unnamed pipes, message queues, shared memory, and signals</a:t>
             </a:r>
           </a:p>
           <a:p>
@@ -7844,7 +7828,7 @@
     </p:spTree>
     <p:extLst>
       <p:ext uri="{BB962C8B-B14F-4D97-AF65-F5344CB8AC3E}">
-        <p14:creationId xmlns="" xmlns:a="http://schemas.openxmlformats.org/drawingml/2006/main" xmlns:r="http://schemas.openxmlformats.org/officeDocument/2006/relationships" xmlns:p="http://schemas.openxmlformats.org/presentationml/2006/main" xmlns:p14="http://schemas.microsoft.com/office/powerpoint/2010/main" xmlns:mv="urn:schemas-microsoft-com:mac:vml" xmlns:mc="http://schemas.openxmlformats.org/markup-compatibility/2006" val="861637662"/>
+        <p14:creationId xmlns:mc="http://schemas.openxmlformats.org/markup-compatibility/2006" xmlns:mv="urn:schemas-microsoft-com:mac:vml" xmlns:p14="http://schemas.microsoft.com/office/powerpoint/2010/main" xmlns:p="http://schemas.openxmlformats.org/presentationml/2006/main" xmlns:r="http://schemas.openxmlformats.org/officeDocument/2006/relationships" xmlns:a="http://schemas.openxmlformats.org/drawingml/2006/main" xmlns="" val="861637662"/>
       </p:ext>
     </p:extLst>
   </p:cSld>
@@ -8065,7 +8049,7 @@
     </p:spTree>
     <p:extLst>
       <p:ext uri="{BB962C8B-B14F-4D97-AF65-F5344CB8AC3E}">
-        <p14:creationId xmlns="" xmlns:a="http://schemas.openxmlformats.org/drawingml/2006/main" xmlns:r="http://schemas.openxmlformats.org/officeDocument/2006/relationships" xmlns:p="http://schemas.openxmlformats.org/presentationml/2006/main" xmlns:p14="http://schemas.microsoft.com/office/powerpoint/2010/main" xmlns:mv="urn:schemas-microsoft-com:mac:vml" xmlns:mc="http://schemas.openxmlformats.org/markup-compatibility/2006" val="861637662"/>
+        <p14:creationId xmlns:mc="http://schemas.openxmlformats.org/markup-compatibility/2006" xmlns:mv="urn:schemas-microsoft-com:mac:vml" xmlns:p14="http://schemas.microsoft.com/office/powerpoint/2010/main" xmlns:p="http://schemas.openxmlformats.org/presentationml/2006/main" xmlns:r="http://schemas.openxmlformats.org/officeDocument/2006/relationships" xmlns:a="http://schemas.openxmlformats.org/drawingml/2006/main" xmlns="" val="861637662"/>
       </p:ext>
     </p:extLst>
   </p:cSld>
@@ -8250,7 +8234,7 @@
     </p:spTree>
     <p:extLst>
       <p:ext uri="{BB962C8B-B14F-4D97-AF65-F5344CB8AC3E}">
-        <p14:creationId xmlns="" xmlns:a="http://schemas.openxmlformats.org/drawingml/2006/main" xmlns:r="http://schemas.openxmlformats.org/officeDocument/2006/relationships" xmlns:p="http://schemas.openxmlformats.org/presentationml/2006/main" xmlns:p14="http://schemas.microsoft.com/office/powerpoint/2010/main" xmlns:mv="urn:schemas-microsoft-com:mac:vml" xmlns:mc="http://schemas.openxmlformats.org/markup-compatibility/2006" val="3067797489"/>
+        <p14:creationId xmlns:mc="http://schemas.openxmlformats.org/markup-compatibility/2006" xmlns:mv="urn:schemas-microsoft-com:mac:vml" xmlns:p14="http://schemas.microsoft.com/office/powerpoint/2010/main" xmlns:p="http://schemas.openxmlformats.org/presentationml/2006/main" xmlns:r="http://schemas.openxmlformats.org/officeDocument/2006/relationships" xmlns:a="http://schemas.openxmlformats.org/drawingml/2006/main" xmlns="" val="3067797489"/>
       </p:ext>
     </p:extLst>
   </p:cSld>
@@ -8497,7 +8481,7 @@
     </p:spTree>
     <p:extLst>
       <p:ext uri="{BB962C8B-B14F-4D97-AF65-F5344CB8AC3E}">
-        <p14:creationId xmlns="" xmlns:a="http://schemas.openxmlformats.org/drawingml/2006/main" xmlns:r="http://schemas.openxmlformats.org/officeDocument/2006/relationships" xmlns:p="http://schemas.openxmlformats.org/presentationml/2006/main" xmlns:p14="http://schemas.microsoft.com/office/powerpoint/2010/main" xmlns:mv="urn:schemas-microsoft-com:mac:vml" xmlns:mc="http://schemas.openxmlformats.org/markup-compatibility/2006" val="1024694207"/>
+        <p14:creationId xmlns:mc="http://schemas.openxmlformats.org/markup-compatibility/2006" xmlns:mv="urn:schemas-microsoft-com:mac:vml" xmlns:p14="http://schemas.microsoft.com/office/powerpoint/2010/main" xmlns:p="http://schemas.openxmlformats.org/presentationml/2006/main" xmlns:r="http://schemas.openxmlformats.org/officeDocument/2006/relationships" xmlns:a="http://schemas.openxmlformats.org/drawingml/2006/main" xmlns="" val="1024694207"/>
       </p:ext>
     </p:extLst>
   </p:cSld>
@@ -8564,7 +8548,7 @@
             <p:ph idx="1"/>
             <p:extLst>
               <p:ext uri="{D42A27DB-BD31-4B8C-83A1-F6EECF244321}">
-                <p14:modId xmlns="" xmlns:a="http://schemas.openxmlformats.org/drawingml/2006/main" xmlns:r="http://schemas.openxmlformats.org/officeDocument/2006/relationships" xmlns:p="http://schemas.openxmlformats.org/presentationml/2006/main" xmlns:p14="http://schemas.microsoft.com/office/powerpoint/2010/main" xmlns:mv="urn:schemas-microsoft-com:mac:vml" xmlns:mc="http://schemas.openxmlformats.org/markup-compatibility/2006" val="1645502410"/>
+                <p14:modId xmlns:mc="http://schemas.openxmlformats.org/markup-compatibility/2006" xmlns:mv="urn:schemas-microsoft-com:mac:vml" xmlns:p14="http://schemas.microsoft.com/office/powerpoint/2010/main" xmlns:p="http://schemas.openxmlformats.org/presentationml/2006/main" xmlns:r="http://schemas.openxmlformats.org/officeDocument/2006/relationships" xmlns:a="http://schemas.openxmlformats.org/drawingml/2006/main" xmlns="" val="1645502410"/>
               </p:ext>
             </p:extLst>
           </p:nvPr>
@@ -10696,7 +10680,7 @@
     </p:spTree>
     <p:extLst>
       <p:ext uri="{BB962C8B-B14F-4D97-AF65-F5344CB8AC3E}">
-        <p14:creationId xmlns="" xmlns:a="http://schemas.openxmlformats.org/drawingml/2006/main" xmlns:r="http://schemas.openxmlformats.org/officeDocument/2006/relationships" xmlns:p="http://schemas.openxmlformats.org/presentationml/2006/main" xmlns:p14="http://schemas.microsoft.com/office/powerpoint/2010/main" xmlns:mv="urn:schemas-microsoft-com:mac:vml" xmlns:mc="http://schemas.openxmlformats.org/markup-compatibility/2006" val="3617157534"/>
+        <p14:creationId xmlns:mc="http://schemas.openxmlformats.org/markup-compatibility/2006" xmlns:mv="urn:schemas-microsoft-com:mac:vml" xmlns:p14="http://schemas.microsoft.com/office/powerpoint/2010/main" xmlns:p="http://schemas.openxmlformats.org/presentationml/2006/main" xmlns:r="http://schemas.openxmlformats.org/officeDocument/2006/relationships" xmlns:a="http://schemas.openxmlformats.org/drawingml/2006/main" xmlns="" val="3617157534"/>
       </p:ext>
     </p:extLst>
   </p:cSld>
@@ -10918,7 +10902,7 @@
     </p:spTree>
     <p:extLst>
       <p:ext uri="{BB962C8B-B14F-4D97-AF65-F5344CB8AC3E}">
-        <p14:creationId xmlns="" xmlns:a="http://schemas.openxmlformats.org/drawingml/2006/main" xmlns:r="http://schemas.openxmlformats.org/officeDocument/2006/relationships" xmlns:p="http://schemas.openxmlformats.org/presentationml/2006/main" xmlns:p14="http://schemas.microsoft.com/office/powerpoint/2010/main" xmlns:mv="urn:schemas-microsoft-com:mac:vml" xmlns:mc="http://schemas.openxmlformats.org/markup-compatibility/2006" val="2215993765"/>
+        <p14:creationId xmlns:mc="http://schemas.openxmlformats.org/markup-compatibility/2006" xmlns:mv="urn:schemas-microsoft-com:mac:vml" xmlns:p14="http://schemas.microsoft.com/office/powerpoint/2010/main" xmlns:p="http://schemas.openxmlformats.org/presentationml/2006/main" xmlns:r="http://schemas.openxmlformats.org/officeDocument/2006/relationships" xmlns:a="http://schemas.openxmlformats.org/drawingml/2006/main" xmlns="" val="2215993765"/>
       </p:ext>
     </p:extLst>
   </p:cSld>
@@ -11135,7 +11119,7 @@
     </p:spTree>
     <p:extLst>
       <p:ext uri="{BB962C8B-B14F-4D97-AF65-F5344CB8AC3E}">
-        <p14:creationId xmlns="" xmlns:a="http://schemas.openxmlformats.org/drawingml/2006/main" xmlns:r="http://schemas.openxmlformats.org/officeDocument/2006/relationships" xmlns:p="http://schemas.openxmlformats.org/presentationml/2006/main" xmlns:p14="http://schemas.microsoft.com/office/powerpoint/2010/main" xmlns:mv="urn:schemas-microsoft-com:mac:vml" xmlns:mc="http://schemas.openxmlformats.org/markup-compatibility/2006" val="841459848"/>
+        <p14:creationId xmlns:mc="http://schemas.openxmlformats.org/markup-compatibility/2006" xmlns:mv="urn:schemas-microsoft-com:mac:vml" xmlns:p14="http://schemas.microsoft.com/office/powerpoint/2010/main" xmlns:p="http://schemas.openxmlformats.org/presentationml/2006/main" xmlns:r="http://schemas.openxmlformats.org/officeDocument/2006/relationships" xmlns:a="http://schemas.openxmlformats.org/drawingml/2006/main" xmlns="" val="841459848"/>
       </p:ext>
     </p:extLst>
   </p:cSld>
@@ -11401,7 +11385,7 @@
     </p:spTree>
     <p:extLst>
       <p:ext uri="{BB962C8B-B14F-4D97-AF65-F5344CB8AC3E}">
-        <p14:creationId xmlns="" xmlns:a="http://schemas.openxmlformats.org/drawingml/2006/main" xmlns:r="http://schemas.openxmlformats.org/officeDocument/2006/relationships" xmlns:p="http://schemas.openxmlformats.org/presentationml/2006/main" xmlns:p14="http://schemas.microsoft.com/office/powerpoint/2010/main" xmlns:mv="urn:schemas-microsoft-com:mac:vml" xmlns:mc="http://schemas.openxmlformats.org/markup-compatibility/2006" val="3083857329"/>
+        <p14:creationId xmlns:mc="http://schemas.openxmlformats.org/markup-compatibility/2006" xmlns:mv="urn:schemas-microsoft-com:mac:vml" xmlns:p14="http://schemas.microsoft.com/office/powerpoint/2010/main" xmlns:p="http://schemas.openxmlformats.org/presentationml/2006/main" xmlns:r="http://schemas.openxmlformats.org/officeDocument/2006/relationships" xmlns:a="http://schemas.openxmlformats.org/drawingml/2006/main" xmlns="" val="3083857329"/>
       </p:ext>
     </p:extLst>
   </p:cSld>
@@ -11638,7 +11622,7 @@
     </p:spTree>
     <p:extLst>
       <p:ext uri="{BB962C8B-B14F-4D97-AF65-F5344CB8AC3E}">
-        <p14:creationId xmlns="" xmlns:a="http://schemas.openxmlformats.org/drawingml/2006/main" xmlns:r="http://schemas.openxmlformats.org/officeDocument/2006/relationships" xmlns:p="http://schemas.openxmlformats.org/presentationml/2006/main" xmlns:p14="http://schemas.microsoft.com/office/powerpoint/2010/main" xmlns:mv="urn:schemas-microsoft-com:mac:vml" xmlns:mc="http://schemas.openxmlformats.org/markup-compatibility/2006" val="2169116918"/>
+        <p14:creationId xmlns:mc="http://schemas.openxmlformats.org/markup-compatibility/2006" xmlns:mv="urn:schemas-microsoft-com:mac:vml" xmlns:p14="http://schemas.microsoft.com/office/powerpoint/2010/main" xmlns:p="http://schemas.openxmlformats.org/presentationml/2006/main" xmlns:r="http://schemas.openxmlformats.org/officeDocument/2006/relationships" xmlns:a="http://schemas.openxmlformats.org/drawingml/2006/main" xmlns="" val="2169116918"/>
       </p:ext>
     </p:extLst>
   </p:cSld>
@@ -11878,7 +11862,7 @@
     </p:spTree>
     <p:extLst>
       <p:ext uri="{BB962C8B-B14F-4D97-AF65-F5344CB8AC3E}">
-        <p14:creationId xmlns="" xmlns:a="http://schemas.openxmlformats.org/drawingml/2006/main" xmlns:r="http://schemas.openxmlformats.org/officeDocument/2006/relationships" xmlns:p="http://schemas.openxmlformats.org/presentationml/2006/main" xmlns:p14="http://schemas.microsoft.com/office/powerpoint/2010/main" xmlns:mv="urn:schemas-microsoft-com:mac:vml" xmlns:mc="http://schemas.openxmlformats.org/markup-compatibility/2006" val="1171194116"/>
+        <p14:creationId xmlns:mc="http://schemas.openxmlformats.org/markup-compatibility/2006" xmlns:mv="urn:schemas-microsoft-com:mac:vml" xmlns:p14="http://schemas.microsoft.com/office/powerpoint/2010/main" xmlns:p="http://schemas.openxmlformats.org/presentationml/2006/main" xmlns:r="http://schemas.openxmlformats.org/officeDocument/2006/relationships" xmlns:a="http://schemas.openxmlformats.org/drawingml/2006/main" xmlns="" val="1171194116"/>
       </p:ext>
     </p:extLst>
   </p:cSld>
@@ -12155,7 +12139,7 @@
   <a:extraClrSchemeLst/>
   <a:extLst>
     <a:ext uri="{05A4C25C-085E-4340-85A3-A5531E510DB2}">
-      <thm15:themeFamily xmlns="" xmlns:a="http://schemas.openxmlformats.org/drawingml/2006/main" xmlns:thm15="http://schemas.microsoft.com/office/thememl/2012/main" name="Ion" id="{B8441ADB-2E43-4AF7-B97A-BD870242C6A8}" vid="{292E63A9-BB86-4E3D-B92A-7223C6510D2E}"/>
+      <thm15:themeFamily xmlns:thm15="http://schemas.microsoft.com/office/thememl/2012/main" xmlns:a="http://schemas.openxmlformats.org/drawingml/2006/main" xmlns="" name="Ion" id="{B8441ADB-2E43-4AF7-B97A-BD870242C6A8}" vid="{292E63A9-BB86-4E3D-B92A-7223C6510D2E}"/>
     </a:ext>
   </a:extLst>
 </a:theme>
@@ -12416,7 +12400,7 @@
   <a:extraClrSchemeLst/>
   <a:extLst>
     <a:ext uri="{05A4C25C-085E-4340-85A3-A5531E510DB2}">
-      <thm15:themeFamily xmlns="" xmlns:a="http://schemas.openxmlformats.org/drawingml/2006/main" xmlns:thm15="http://schemas.microsoft.com/office/thememl/2012/main" name="Office Theme" id="{62F939B6-93AF-4DB8-9C6B-D6C7DFDC589F}" vid="{4A3C46E8-61CC-4603-A589-7422A47A8E4A}"/>
+      <thm15:themeFamily xmlns:thm15="http://schemas.microsoft.com/office/thememl/2012/main" xmlns:a="http://schemas.openxmlformats.org/drawingml/2006/main" xmlns="" name="Office Theme" id="{62F939B6-93AF-4DB8-9C6B-D6C7DFDC589F}" vid="{4A3C46E8-61CC-4603-A589-7422A47A8E4A}"/>
     </a:ext>
   </a:extLst>
 </a:theme>

</xml_diff>